<commit_message>
changes after course ended
</commit_message>
<xml_diff>
--- a/powerpoint/Session1.pptx
+++ b/powerpoint/Session1.pptx
@@ -148,7 +148,7 @@
 <file path=ppt/revisionInfo.xml><?xml version="1.0" encoding="utf-8"?>
 <p1510:revInfo xmlns:a="http://schemas.openxmlformats.org/drawingml/2006/main" xmlns:r="http://schemas.openxmlformats.org/officeDocument/2006/relationships" xmlns:p1510="http://schemas.microsoft.com/office/powerpoint/2015/10/main">
   <p1510:revLst>
-    <p1510:client id="{6B9E06D8-20C2-D848-A103-87A0E5BBED98}" v="2" dt="2023-10-10T08:08:36.902"/>
+    <p1510:client id="{6B9E06D8-20C2-D848-A103-87A0E5BBED98}" v="9" dt="2023-10-10T10:24:38.899"/>
   </p1510:revLst>
 </p1510:revInfo>
 </file>
@@ -158,7 +158,7 @@
   <pc:docChgLst>
     <pc:chgData name="Srinivasa Rao" userId="a6b54366-f13d-4292-8bb4-f06c50909b1e" providerId="ADAL" clId="{6B9E06D8-20C2-D848-A103-87A0E5BBED98}"/>
     <pc:docChg chg="custSel addSld delSld modSld sldOrd">
-      <pc:chgData name="Srinivasa Rao" userId="a6b54366-f13d-4292-8bb4-f06c50909b1e" providerId="ADAL" clId="{6B9E06D8-20C2-D848-A103-87A0E5BBED98}" dt="2023-10-10T08:09:11.243" v="218" actId="14100"/>
+      <pc:chgData name="Srinivasa Rao" userId="a6b54366-f13d-4292-8bb4-f06c50909b1e" providerId="ADAL" clId="{6B9E06D8-20C2-D848-A103-87A0E5BBED98}" dt="2023-10-10T10:24:42.232" v="226" actId="14100"/>
       <pc:docMkLst>
         <pc:docMk/>
       </pc:docMkLst>
@@ -197,6 +197,21 @@
             <pc:docMk/>
             <pc:sldMk cId="0" sldId="257"/>
             <ac:spMk id="230" creationId="{00000000-0000-0000-0000-000000000000}"/>
+          </ac:spMkLst>
+        </pc:spChg>
+      </pc:sldChg>
+      <pc:sldChg chg="modSp mod">
+        <pc:chgData name="Srinivasa Rao" userId="a6b54366-f13d-4292-8bb4-f06c50909b1e" providerId="ADAL" clId="{6B9E06D8-20C2-D848-A103-87A0E5BBED98}" dt="2023-10-10T10:24:42.232" v="226" actId="14100"/>
+        <pc:sldMkLst>
+          <pc:docMk/>
+          <pc:sldMk cId="0" sldId="269"/>
+        </pc:sldMkLst>
+        <pc:spChg chg="mod">
+          <ac:chgData name="Srinivasa Rao" userId="a6b54366-f13d-4292-8bb4-f06c50909b1e" providerId="ADAL" clId="{6B9E06D8-20C2-D848-A103-87A0E5BBED98}" dt="2023-10-10T10:24:42.232" v="226" actId="14100"/>
+          <ac:spMkLst>
+            <pc:docMk/>
+            <pc:sldMk cId="0" sldId="269"/>
+            <ac:spMk id="341" creationId="{00000000-0000-0000-0000-000000000000}"/>
           </ac:spMkLst>
         </pc:spChg>
       </pc:sldChg>
@@ -28849,16 +28864,26 @@
               </a:tabLst>
             </a:pPr>
             <a:r>
-              <a:rPr lang="en-GB" sz="1640" b="0" strike="noStrike" spc="-1">
+              <a:rPr lang="en-GB" sz="1640" b="0" strike="noStrike" spc="-1" dirty="0" err="1">
                 <a:solidFill>
                   <a:srgbClr val="E46C0A"/>
                 </a:solidFill>
                 <a:latin typeface="Courier New"/>
                 <a:ea typeface="DejaVu Sans"/>
               </a:rPr>
-              <a:t>My_df[ , 3]</a:t>
+              <a:t>My_df</a:t>
             </a:r>
-            <a:endParaRPr lang="en-GB" sz="1640" b="0" strike="noStrike" spc="-1">
+            <a:r>
+              <a:rPr lang="en-GB" sz="1640" b="0" strike="noStrike" spc="-1" dirty="0">
+                <a:solidFill>
+                  <a:srgbClr val="E46C0A"/>
+                </a:solidFill>
+                <a:latin typeface="Courier New"/>
+                <a:ea typeface="DejaVu Sans"/>
+              </a:rPr>
+              <a:t>[ , 3]</a:t>
+            </a:r>
+            <a:endParaRPr lang="en-GB" sz="1640" b="0" strike="noStrike" spc="-1" dirty="0">
               <a:latin typeface="Arial"/>
             </a:endParaRPr>
           </a:p>
@@ -29645,8 +29670,8 @@
         </p:nvSpPr>
         <p:spPr>
           <a:xfrm>
-            <a:off x="4222800" y="4875480"/>
-            <a:ext cx="1814040" cy="343256"/>
+            <a:off x="4222799" y="4875480"/>
+            <a:ext cx="2688639" cy="343256"/>
           </a:xfrm>
           <a:prstGeom prst="rect">
             <a:avLst/>
@@ -29669,7 +29694,7 @@
           <a:fontRef idx="minor"/>
         </p:style>
         <p:txBody>
-          <a:bodyPr lIns="90000" tIns="45000" rIns="90000" bIns="45000">
+          <a:bodyPr wrap="square" lIns="90000" tIns="45000" rIns="90000" bIns="45000">
             <a:spAutoFit/>
           </a:bodyPr>
           <a:lstStyle/>
@@ -29700,7 +29725,7 @@
                 <a:latin typeface="Courier New"/>
                 <a:ea typeface="DejaVu Sans"/>
               </a:rPr>
-              <a:t>Gene_id</a:t>
+              <a:t>Gene_count</a:t>
             </a:r>
             <a:endParaRPr lang="en-GB" sz="1640" b="0" strike="noStrike" spc="-1" dirty="0">
               <a:latin typeface="Arial"/>

</xml_diff>